<commit_message>
update test case; generate function definition
</commit_message>
<xml_diff>
--- a/weekly_report/group2/第11周汇报.pptx
+++ b/weekly_report/group2/第11周汇报.pptx
@@ -12,14 +12,15 @@
     <p:sldId id="261" r:id="rId6"/>
     <p:sldId id="259" r:id="rId7"/>
     <p:sldId id="268" r:id="rId8"/>
-    <p:sldId id="262" r:id="rId9"/>
-    <p:sldId id="263" r:id="rId10"/>
-    <p:sldId id="264" r:id="rId11"/>
-    <p:sldId id="265" r:id="rId12"/>
-    <p:sldId id="266" r:id="rId13"/>
-    <p:sldId id="267" r:id="rId14"/>
-    <p:sldId id="269" r:id="rId15"/>
-    <p:sldId id="271" r:id="rId16"/>
+    <p:sldId id="272" r:id="rId9"/>
+    <p:sldId id="262" r:id="rId10"/>
+    <p:sldId id="263" r:id="rId11"/>
+    <p:sldId id="264" r:id="rId12"/>
+    <p:sldId id="265" r:id="rId13"/>
+    <p:sldId id="266" r:id="rId14"/>
+    <p:sldId id="267" r:id="rId15"/>
+    <p:sldId id="269" r:id="rId16"/>
+    <p:sldId id="271" r:id="rId17"/>
   </p:sldIdLst>
   <p:sldSz cx="12192000" cy="6858000"/>
   <p:notesSz cx="6858000" cy="9144000"/>
@@ -142,6 +143,7 @@
           <p14:sldIdLst>
             <p14:sldId id="259"/>
             <p14:sldId id="268"/>
+            <p14:sldId id="272"/>
           </p14:sldIdLst>
         </p14:section>
         <p14:section name="Learning Notes" id="{259C0485-9D8C-444E-BFBE-1D2147EE62FC}">
@@ -167,6 +169,10 @@
     </p:ext>
   </p:extLst>
 </p:presentation>
+</file>
+
+<file path=ppt/revisionInfo.xml><?xml version="1.0" encoding="utf-8"?>
+<p1510:revInfo xmlns:a="http://schemas.openxmlformats.org/drawingml/2006/main" xmlns:r="http://schemas.openxmlformats.org/officeDocument/2006/relationships" xmlns:p1510="http://schemas.microsoft.com/office/powerpoint/2015/10/main"/>
 </file>
 
 <file path=ppt/slideLayouts/slideLayout1.xml><?xml version="1.0" encoding="utf-8"?>
@@ -3721,6 +3727,166 @@
           <a:p>
             <a:r>
               <a:rPr lang="zh-CN" altLang="en-US" dirty="0"/>
+              <a:t>在每个类的 </a:t>
+            </a:r>
+            <a:r>
+              <a:rPr lang="en-US" altLang="zh-CN" dirty="0"/>
+              <a:t>constructor </a:t>
+            </a:r>
+            <a:r>
+              <a:rPr lang="zh-CN" altLang="en-US" dirty="0"/>
+              <a:t>中，首先分配内存，分配的内存长度等于该类的 </a:t>
+            </a:r>
+            <a:r>
+              <a:rPr lang="en-US" altLang="zh-CN" dirty="0"/>
+              <a:t>field </a:t>
+            </a:r>
+            <a:r>
+              <a:rPr lang="zh-CN" altLang="en-US" dirty="0"/>
+              <a:t>个数之和（相当于给该实例的每个 </a:t>
+            </a:r>
+            <a:r>
+              <a:rPr lang="en-US" altLang="zh-CN" dirty="0"/>
+              <a:t>field </a:t>
+            </a:r>
+            <a:r>
+              <a:rPr lang="zh-CN" altLang="en-US" dirty="0"/>
+              <a:t>分配内存）。</a:t>
+            </a:r>
+          </a:p>
+        </p:txBody>
+      </p:sp>
+      <p:pic>
+        <p:nvPicPr>
+          <p:cNvPr id="4" name="图片 3">
+            <a:extLst>
+              <a:ext uri="{FF2B5EF4-FFF2-40B4-BE49-F238E27FC236}">
+                <a16:creationId xmlns:a16="http://schemas.microsoft.com/office/drawing/2014/main" id="{7030DA2A-973E-4EB8-B102-C83076D7BCE8}"/>
+              </a:ext>
+            </a:extLst>
+          </p:cNvPr>
+          <p:cNvPicPr>
+            <a:picLocks noChangeAspect="1"/>
+          </p:cNvPicPr>
+          <p:nvPr/>
+        </p:nvPicPr>
+        <p:blipFill>
+          <a:blip r:embed="rId2"/>
+          <a:stretch>
+            <a:fillRect/>
+          </a:stretch>
+        </p:blipFill>
+        <p:spPr>
+          <a:xfrm>
+            <a:off x="1118895" y="3091656"/>
+            <a:ext cx="5461071" cy="2460058"/>
+          </a:xfrm>
+          <a:prstGeom prst="rect">
+            <a:avLst/>
+          </a:prstGeom>
+        </p:spPr>
+      </p:pic>
+      <p:pic>
+        <p:nvPicPr>
+          <p:cNvPr id="5" name="图片 4">
+            <a:extLst>
+              <a:ext uri="{FF2B5EF4-FFF2-40B4-BE49-F238E27FC236}">
+                <a16:creationId xmlns:a16="http://schemas.microsoft.com/office/drawing/2014/main" id="{A6941598-3B97-487E-8ADE-148D3195DDE1}"/>
+              </a:ext>
+            </a:extLst>
+          </p:cNvPr>
+          <p:cNvPicPr>
+            <a:picLocks noChangeAspect="1"/>
+          </p:cNvPicPr>
+          <p:nvPr/>
+        </p:nvPicPr>
+        <p:blipFill>
+          <a:blip r:embed="rId3"/>
+          <a:stretch>
+            <a:fillRect/>
+          </a:stretch>
+        </p:blipFill>
+        <p:spPr>
+          <a:xfrm>
+            <a:off x="7137335" y="3824886"/>
+            <a:ext cx="4571138" cy="775106"/>
+          </a:xfrm>
+          <a:prstGeom prst="rect">
+            <a:avLst/>
+          </a:prstGeom>
+        </p:spPr>
+      </p:pic>
+    </p:spTree>
+    <p:extLst>
+      <p:ext uri="{BB962C8B-B14F-4D97-AF65-F5344CB8AC3E}">
+        <p14:creationId xmlns:p14="http://schemas.microsoft.com/office/powerpoint/2010/main" val="50088768"/>
+      </p:ext>
+    </p:extLst>
+  </p:cSld>
+  <p:clrMapOvr>
+    <a:masterClrMapping/>
+  </p:clrMapOvr>
+</p:sld>
+</file>
+
+<file path=ppt/slides/slide11.xml><?xml version="1.0" encoding="utf-8"?>
+<p:sld xmlns:a="http://schemas.openxmlformats.org/drawingml/2006/main" xmlns:r="http://schemas.openxmlformats.org/officeDocument/2006/relationships" xmlns:p="http://schemas.openxmlformats.org/presentationml/2006/main">
+  <p:cSld>
+    <p:spTree>
+      <p:nvGrpSpPr>
+        <p:cNvPr id="1" name=""/>
+        <p:cNvGrpSpPr/>
+        <p:nvPr/>
+      </p:nvGrpSpPr>
+      <p:grpSpPr>
+        <a:xfrm>
+          <a:off x="0" y="0"/>
+          <a:ext cx="0" cy="0"/>
+          <a:chOff x="0" y="0"/>
+          <a:chExt cx="0" cy="0"/>
+        </a:xfrm>
+      </p:grpSpPr>
+      <p:sp>
+        <p:nvSpPr>
+          <p:cNvPr id="2" name="标题 1"/>
+          <p:cNvSpPr>
+            <a:spLocks noGrp="1"/>
+          </p:cNvSpPr>
+          <p:nvPr>
+            <p:ph type="title"/>
+          </p:nvPr>
+        </p:nvSpPr>
+        <p:spPr/>
+        <p:txBody>
+          <a:bodyPr/>
+          <a:lstStyle/>
+          <a:p>
+            <a:r>
+              <a:rPr lang="zh-CN" altLang="en-US" dirty="0"/>
+              <a:t>学习笔记</a:t>
+            </a:r>
+          </a:p>
+        </p:txBody>
+      </p:sp>
+      <p:sp>
+        <p:nvSpPr>
+          <p:cNvPr id="3" name="内容占位符 2"/>
+          <p:cNvSpPr>
+            <a:spLocks noGrp="1"/>
+          </p:cNvSpPr>
+          <p:nvPr>
+            <p:ph idx="1"/>
+          </p:nvPr>
+        </p:nvSpPr>
+        <p:spPr/>
+        <p:txBody>
+          <a:bodyPr>
+            <a:normAutofit/>
+          </a:bodyPr>
+          <a:lstStyle/>
+          <a:p>
+            <a:r>
+              <a:rPr lang="zh-CN" altLang="en-US" dirty="0"/>
               <a:t>在每个函数中分配内存后，就是处理变量声明了。</a:t>
             </a:r>
             <a:endParaRPr lang="en-US" altLang="zh-CN" dirty="0"/>
@@ -3859,7 +4025,7 @@
 </p:sld>
 </file>
 
-<file path=ppt/slides/slide11.xml><?xml version="1.0" encoding="utf-8"?>
+<file path=ppt/slides/slide12.xml><?xml version="1.0" encoding="utf-8"?>
 <p:sld xmlns:a="http://schemas.openxmlformats.org/drawingml/2006/main" xmlns:r="http://schemas.openxmlformats.org/officeDocument/2006/relationships" xmlns:p="http://schemas.openxmlformats.org/presentationml/2006/main">
   <p:cSld>
     <p:spTree>
@@ -4033,7 +4199,7 @@
 </p:sld>
 </file>
 
-<file path=ppt/slides/slide12.xml><?xml version="1.0" encoding="utf-8"?>
+<file path=ppt/slides/slide13.xml><?xml version="1.0" encoding="utf-8"?>
 <p:sld xmlns:a="http://schemas.openxmlformats.org/drawingml/2006/main" xmlns:r="http://schemas.openxmlformats.org/officeDocument/2006/relationships" xmlns:p="http://schemas.openxmlformats.org/presentationml/2006/main">
   <p:cSld>
     <p:spTree>
@@ -4242,7 +4408,7 @@
 </p:sld>
 </file>
 
-<file path=ppt/slides/slide13.xml><?xml version="1.0" encoding="utf-8"?>
+<file path=ppt/slides/slide14.xml><?xml version="1.0" encoding="utf-8"?>
 <p:sld xmlns:a="http://schemas.openxmlformats.org/drawingml/2006/main" xmlns:r="http://schemas.openxmlformats.org/officeDocument/2006/relationships" xmlns:p="http://schemas.openxmlformats.org/presentationml/2006/main">
   <p:cSld>
     <p:spTree>
@@ -4442,7 +4608,7 @@
 </p:sld>
 </file>
 
-<file path=ppt/slides/slide14.xml><?xml version="1.0" encoding="utf-8"?>
+<file path=ppt/slides/slide15.xml><?xml version="1.0" encoding="utf-8"?>
 <p:sld xmlns:a="http://schemas.openxmlformats.org/drawingml/2006/main" xmlns:r="http://schemas.openxmlformats.org/officeDocument/2006/relationships" xmlns:p="http://schemas.openxmlformats.org/presentationml/2006/main">
   <p:cSld>
     <p:spTree>
@@ -5250,7 +5416,7 @@
 </p:sld>
 </file>
 
-<file path=ppt/slides/slide15.xml><?xml version="1.0" encoding="utf-8"?>
+<file path=ppt/slides/slide16.xml><?xml version="1.0" encoding="utf-8"?>
 <p:sld xmlns:a="http://schemas.openxmlformats.org/drawingml/2006/main" xmlns:r="http://schemas.openxmlformats.org/officeDocument/2006/relationships" xmlns:p="http://schemas.openxmlformats.org/presentationml/2006/main">
   <p:cSld>
     <p:spTree>
@@ -8265,7 +8431,13 @@
       </p:grpSpPr>
       <p:sp>
         <p:nvSpPr>
-          <p:cNvPr id="2" name="标题 1"/>
+          <p:cNvPr id="2" name="标题 1">
+            <a:extLst>
+              <a:ext uri="{FF2B5EF4-FFF2-40B4-BE49-F238E27FC236}">
+                <a16:creationId xmlns:a16="http://schemas.microsoft.com/office/drawing/2014/main" id="{710C1477-F056-4512-8739-B81EB1CCF5D5}"/>
+              </a:ext>
+            </a:extLst>
+          </p:cNvPr>
           <p:cNvSpPr>
             <a:spLocks noGrp="1"/>
           </p:cNvSpPr>
@@ -8279,194 +8451,128 @@
           <a:lstStyle/>
           <a:p>
             <a:r>
-              <a:rPr lang="zh-CN" altLang="en-US" dirty="0"/>
-              <a:t>学习笔记</a:t>
-            </a:r>
-          </a:p>
-        </p:txBody>
-      </p:sp>
-      <p:sp>
-        <p:nvSpPr>
-          <p:cNvPr id="3" name="内容占位符 2"/>
-          <p:cNvSpPr>
-            <a:spLocks noGrp="1"/>
-          </p:cNvSpPr>
-          <p:nvPr>
-            <p:ph idx="1"/>
-          </p:nvPr>
-        </p:nvSpPr>
-        <p:spPr/>
-        <p:txBody>
-          <a:bodyPr>
-            <a:normAutofit/>
-          </a:bodyPr>
-          <a:lstStyle/>
-          <a:p>
-            <a:r>
-              <a:rPr lang="zh-CN" altLang="en-US" dirty="0"/>
-              <a:t>每个类对应一个单独的 </a:t>
-            </a:r>
-            <a:r>
-              <a:rPr lang="en-US" altLang="zh-CN" dirty="0" err="1"/>
-              <a:t>vm</a:t>
-            </a:r>
-            <a:r>
-              <a:rPr lang="en-US" altLang="zh-CN" dirty="0"/>
-              <a:t> </a:t>
-            </a:r>
-            <a:r>
-              <a:rPr lang="zh-CN" altLang="en-US" dirty="0"/>
-              <a:t>文件</a:t>
-            </a:r>
-            <a:endParaRPr lang="en-US" altLang="zh-CN" dirty="0"/>
-          </a:p>
-          <a:p>
-            <a:r>
-              <a:rPr lang="zh-CN" altLang="en-US" dirty="0"/>
-              <a:t>每一个 </a:t>
-            </a:r>
-            <a:r>
-              <a:rPr lang="en-US" altLang="zh-CN" dirty="0"/>
-              <a:t>constructor</a:t>
-            </a:r>
-            <a:r>
-              <a:rPr lang="zh-CN" altLang="en-US" dirty="0"/>
-              <a:t>、</a:t>
-            </a:r>
-            <a:r>
-              <a:rPr lang="en-US" altLang="zh-CN" dirty="0"/>
-              <a:t>method </a:t>
-            </a:r>
-            <a:r>
-              <a:rPr lang="zh-CN" altLang="en-US" dirty="0"/>
-              <a:t>或者 </a:t>
-            </a:r>
-            <a:r>
-              <a:rPr lang="en-US" altLang="zh-CN" dirty="0"/>
-              <a:t>function </a:t>
-            </a:r>
-            <a:r>
-              <a:rPr lang="zh-CN" altLang="en-US" dirty="0"/>
-              <a:t>对应一个 </a:t>
-            </a:r>
-            <a:r>
-              <a:rPr lang="en-US" altLang="zh-CN" dirty="0"/>
-              <a:t>function</a:t>
-            </a:r>
-          </a:p>
-          <a:p>
-            <a:r>
-              <a:rPr lang="zh-CN" altLang="en-US" dirty="0"/>
-              <a:t>命名规则是“类名</a:t>
-            </a:r>
-            <a:r>
-              <a:rPr lang="en-US" altLang="zh-CN" dirty="0"/>
-              <a:t>.</a:t>
-            </a:r>
-            <a:r>
-              <a:rPr lang="zh-CN" altLang="en-US" dirty="0"/>
-              <a:t>函数名”。不同类的函数名称可以相互区分。</a:t>
-            </a:r>
-          </a:p>
-          <a:p>
+              <a:rPr lang="en-US" altLang="zh-CN" dirty="0"/>
+              <a:t>Validation</a:t>
+            </a:r>
             <a:endParaRPr lang="zh-CN" altLang="en-US" dirty="0"/>
           </a:p>
         </p:txBody>
       </p:sp>
-      <p:pic>
-        <p:nvPicPr>
-          <p:cNvPr id="5" name="图片 4">
-            <a:extLst>
-              <a:ext uri="{FF2B5EF4-FFF2-40B4-BE49-F238E27FC236}">
-                <a16:creationId xmlns:a16="http://schemas.microsoft.com/office/drawing/2014/main" id="{1750C1A7-BEDF-4822-8AAD-C7D8FFAD56FA}"/>
-              </a:ext>
-            </a:extLst>
-          </p:cNvPr>
-          <p:cNvPicPr>
-            <a:picLocks noChangeAspect="1"/>
-          </p:cNvPicPr>
+      <p:grpSp>
+        <p:nvGrpSpPr>
+          <p:cNvPr id="7" name="组合 6">
+            <a:extLst>
+              <a:ext uri="{FF2B5EF4-FFF2-40B4-BE49-F238E27FC236}">
+                <a16:creationId xmlns:a16="http://schemas.microsoft.com/office/drawing/2014/main" id="{9BC35BF6-30A6-424B-9F94-DA6E0C8D9AD0}"/>
+              </a:ext>
+            </a:extLst>
+          </p:cNvPr>
+          <p:cNvGrpSpPr/>
           <p:nvPr/>
-        </p:nvPicPr>
-        <p:blipFill>
-          <a:blip r:embed="rId2"/>
-          <a:stretch>
-            <a:fillRect/>
-          </a:stretch>
-        </p:blipFill>
-        <p:spPr>
+        </p:nvGrpSpPr>
+        <p:grpSpPr>
           <a:xfrm>
-            <a:off x="6428987" y="4632648"/>
-            <a:ext cx="5238370" cy="542714"/>
+            <a:off x="2081743" y="133350"/>
+            <a:ext cx="9272057" cy="6591300"/>
+            <a:chOff x="538163" y="201083"/>
+            <a:chExt cx="9272057" cy="6591300"/>
           </a:xfrm>
-          <a:prstGeom prst="rect">
-            <a:avLst/>
-          </a:prstGeom>
-        </p:spPr>
-      </p:pic>
-      <p:pic>
-        <p:nvPicPr>
-          <p:cNvPr id="6" name="图片 5">
-            <a:extLst>
-              <a:ext uri="{FF2B5EF4-FFF2-40B4-BE49-F238E27FC236}">
-                <a16:creationId xmlns:a16="http://schemas.microsoft.com/office/drawing/2014/main" id="{30FAD506-FADC-4BF8-AA18-BA73A44DFFAD}"/>
-              </a:ext>
-            </a:extLst>
-          </p:cNvPr>
-          <p:cNvPicPr>
-            <a:picLocks noChangeAspect="1"/>
-          </p:cNvPicPr>
-          <p:nvPr/>
-        </p:nvPicPr>
-        <p:blipFill>
-          <a:blip r:embed="rId3"/>
-          <a:stretch>
-            <a:fillRect/>
-          </a:stretch>
-        </p:blipFill>
-        <p:spPr>
-          <a:xfrm>
-            <a:off x="838200" y="4113261"/>
-            <a:ext cx="4233169" cy="542714"/>
-          </a:xfrm>
-          <a:prstGeom prst="rect">
-            <a:avLst/>
-          </a:prstGeom>
-        </p:spPr>
-      </p:pic>
-      <p:pic>
-        <p:nvPicPr>
-          <p:cNvPr id="8" name="图片 7">
-            <a:extLst>
-              <a:ext uri="{FF2B5EF4-FFF2-40B4-BE49-F238E27FC236}">
-                <a16:creationId xmlns:a16="http://schemas.microsoft.com/office/drawing/2014/main" id="{79EA6BC2-D6C2-4711-A6AB-6BB4D09BBFE9}"/>
-              </a:ext>
-            </a:extLst>
-          </p:cNvPr>
-          <p:cNvPicPr>
-            <a:picLocks noChangeAspect="1"/>
-          </p:cNvPicPr>
-          <p:nvPr/>
-        </p:nvPicPr>
-        <p:blipFill>
-          <a:blip r:embed="rId4"/>
-          <a:stretch>
-            <a:fillRect/>
-          </a:stretch>
-        </p:blipFill>
-        <p:spPr>
-          <a:xfrm>
-            <a:off x="838199" y="4904005"/>
-            <a:ext cx="4233169" cy="875828"/>
-          </a:xfrm>
-          <a:prstGeom prst="rect">
-            <a:avLst/>
-          </a:prstGeom>
-        </p:spPr>
-      </p:pic>
+        </p:grpSpPr>
+        <p:pic>
+          <p:nvPicPr>
+            <p:cNvPr id="4" name="图片 3">
+              <a:extLst>
+                <a:ext uri="{FF2B5EF4-FFF2-40B4-BE49-F238E27FC236}">
+                  <a16:creationId xmlns:a16="http://schemas.microsoft.com/office/drawing/2014/main" id="{4C5A259C-4698-4E13-8416-07EB0599FB48}"/>
+                </a:ext>
+              </a:extLst>
+            </p:cNvPr>
+            <p:cNvPicPr>
+              <a:picLocks noChangeAspect="1"/>
+            </p:cNvPicPr>
+            <p:nvPr/>
+          </p:nvPicPr>
+          <p:blipFill>
+            <a:blip r:embed="rId2"/>
+            <a:stretch>
+              <a:fillRect/>
+            </a:stretch>
+          </p:blipFill>
+          <p:spPr>
+            <a:xfrm>
+              <a:off x="538163" y="1690687"/>
+              <a:ext cx="5380157" cy="2999845"/>
+            </a:xfrm>
+            <a:prstGeom prst="rect">
+              <a:avLst/>
+            </a:prstGeom>
+          </p:spPr>
+        </p:pic>
+        <p:pic>
+          <p:nvPicPr>
+            <p:cNvPr id="5" name="图片 4">
+              <a:extLst>
+                <a:ext uri="{FF2B5EF4-FFF2-40B4-BE49-F238E27FC236}">
+                  <a16:creationId xmlns:a16="http://schemas.microsoft.com/office/drawing/2014/main" id="{B5E6C4F7-83F9-4CFE-BCAC-350C65FCF6D8}"/>
+                </a:ext>
+              </a:extLst>
+            </p:cNvPr>
+            <p:cNvPicPr>
+              <a:picLocks noChangeAspect="1"/>
+            </p:cNvPicPr>
+            <p:nvPr/>
+          </p:nvPicPr>
+          <p:blipFill>
+            <a:blip r:embed="rId3"/>
+            <a:stretch>
+              <a:fillRect/>
+            </a:stretch>
+          </p:blipFill>
+          <p:spPr>
+            <a:xfrm>
+              <a:off x="5209645" y="201083"/>
+              <a:ext cx="4600575" cy="6591300"/>
+            </a:xfrm>
+            <a:prstGeom prst="rect">
+              <a:avLst/>
+            </a:prstGeom>
+          </p:spPr>
+        </p:pic>
+        <p:pic>
+          <p:nvPicPr>
+            <p:cNvPr id="6" name="图片 5">
+              <a:extLst>
+                <a:ext uri="{FF2B5EF4-FFF2-40B4-BE49-F238E27FC236}">
+                  <a16:creationId xmlns:a16="http://schemas.microsoft.com/office/drawing/2014/main" id="{AAE89C5D-186E-43CC-83BB-B3C516A38D82}"/>
+                </a:ext>
+              </a:extLst>
+            </p:cNvPr>
+            <p:cNvPicPr>
+              <a:picLocks noChangeAspect="1"/>
+            </p:cNvPicPr>
+            <p:nvPr/>
+          </p:nvPicPr>
+          <p:blipFill>
+            <a:blip r:embed="rId4"/>
+            <a:stretch>
+              <a:fillRect/>
+            </a:stretch>
+          </p:blipFill>
+          <p:spPr>
+            <a:xfrm>
+              <a:off x="538163" y="5167313"/>
+              <a:ext cx="3825027" cy="844020"/>
+            </a:xfrm>
+            <a:prstGeom prst="rect">
+              <a:avLst/>
+            </a:prstGeom>
+          </p:spPr>
+        </p:pic>
+      </p:grpSp>
     </p:spTree>
     <p:extLst>
       <p:ext uri="{BB962C8B-B14F-4D97-AF65-F5344CB8AC3E}">
-        <p14:creationId xmlns:p14="http://schemas.microsoft.com/office/powerpoint/2010/main" val="3575198876"/>
+        <p14:creationId xmlns:p14="http://schemas.microsoft.com/office/powerpoint/2010/main" val="2536912709"/>
       </p:ext>
     </p:extLst>
   </p:cSld>
@@ -8534,41 +8640,81 @@
           <a:p>
             <a:r>
               <a:rPr lang="zh-CN" altLang="en-US" dirty="0"/>
-              <a:t>在每个类的 </a:t>
-            </a:r>
-            <a:r>
-              <a:rPr lang="en-US" altLang="zh-CN" dirty="0"/>
-              <a:t>constructor </a:t>
+              <a:t>每个类对应一个单独的 </a:t>
+            </a:r>
+            <a:r>
+              <a:rPr lang="en-US" altLang="zh-CN" dirty="0" err="1"/>
+              <a:t>vm</a:t>
+            </a:r>
+            <a:r>
+              <a:rPr lang="en-US" altLang="zh-CN" dirty="0"/>
+              <a:t> </a:t>
             </a:r>
             <a:r>
               <a:rPr lang="zh-CN" altLang="en-US" dirty="0"/>
-              <a:t>中，首先分配内存，分配的内存长度等于该类的 </a:t>
-            </a:r>
-            <a:r>
-              <a:rPr lang="en-US" altLang="zh-CN" dirty="0"/>
-              <a:t>field </a:t>
-            </a:r>
+              <a:t>文件</a:t>
+            </a:r>
+            <a:endParaRPr lang="en-US" altLang="zh-CN" dirty="0"/>
+          </a:p>
+          <a:p>
             <a:r>
               <a:rPr lang="zh-CN" altLang="en-US" dirty="0"/>
-              <a:t>个数之和（相当于给该实例的每个 </a:t>
-            </a:r>
-            <a:r>
-              <a:rPr lang="en-US" altLang="zh-CN" dirty="0"/>
-              <a:t>field </a:t>
+              <a:t>每一个 </a:t>
+            </a:r>
+            <a:r>
+              <a:rPr lang="en-US" altLang="zh-CN" dirty="0"/>
+              <a:t>constructor</a:t>
             </a:r>
             <a:r>
               <a:rPr lang="zh-CN" altLang="en-US" dirty="0"/>
-              <a:t>分配内存）。</a:t>
-            </a:r>
+              <a:t>、</a:t>
+            </a:r>
+            <a:r>
+              <a:rPr lang="en-US" altLang="zh-CN" dirty="0"/>
+              <a:t>method </a:t>
+            </a:r>
+            <a:r>
+              <a:rPr lang="zh-CN" altLang="en-US" dirty="0"/>
+              <a:t>或者 </a:t>
+            </a:r>
+            <a:r>
+              <a:rPr lang="en-US" altLang="zh-CN" dirty="0"/>
+              <a:t>function </a:t>
+            </a:r>
+            <a:r>
+              <a:rPr lang="zh-CN" altLang="en-US" dirty="0"/>
+              <a:t>对应一个 </a:t>
+            </a:r>
+            <a:r>
+              <a:rPr lang="en-US" altLang="zh-CN" dirty="0"/>
+              <a:t>function</a:t>
+            </a:r>
+          </a:p>
+          <a:p>
+            <a:r>
+              <a:rPr lang="zh-CN" altLang="en-US" dirty="0"/>
+              <a:t>命名规则是“类名</a:t>
+            </a:r>
+            <a:r>
+              <a:rPr lang="en-US" altLang="zh-CN" dirty="0"/>
+              <a:t>.</a:t>
+            </a:r>
+            <a:r>
+              <a:rPr lang="zh-CN" altLang="en-US" dirty="0"/>
+              <a:t>函数名”。不同类的函数名称可以相互区分。</a:t>
+            </a:r>
+          </a:p>
+          <a:p>
+            <a:endParaRPr lang="zh-CN" altLang="en-US" dirty="0"/>
           </a:p>
         </p:txBody>
       </p:sp>
       <p:pic>
         <p:nvPicPr>
-          <p:cNvPr id="4" name="图片 3">
-            <a:extLst>
-              <a:ext uri="{FF2B5EF4-FFF2-40B4-BE49-F238E27FC236}">
-                <a16:creationId xmlns:a16="http://schemas.microsoft.com/office/drawing/2014/main" id="{7030DA2A-973E-4EB8-B102-C83076D7BCE8}"/>
+          <p:cNvPr id="5" name="图片 4">
+            <a:extLst>
+              <a:ext uri="{FF2B5EF4-FFF2-40B4-BE49-F238E27FC236}">
+                <a16:creationId xmlns:a16="http://schemas.microsoft.com/office/drawing/2014/main" id="{1750C1A7-BEDF-4822-8AAD-C7D8FFAD56FA}"/>
               </a:ext>
             </a:extLst>
           </p:cNvPr>
@@ -8585,8 +8731,8 @@
         </p:blipFill>
         <p:spPr>
           <a:xfrm>
-            <a:off x="1118895" y="3091656"/>
-            <a:ext cx="5461071" cy="2460058"/>
+            <a:off x="6428987" y="4632648"/>
+            <a:ext cx="5238370" cy="542714"/>
           </a:xfrm>
           <a:prstGeom prst="rect">
             <a:avLst/>
@@ -8595,10 +8741,10 @@
       </p:pic>
       <p:pic>
         <p:nvPicPr>
-          <p:cNvPr id="5" name="图片 4">
-            <a:extLst>
-              <a:ext uri="{FF2B5EF4-FFF2-40B4-BE49-F238E27FC236}">
-                <a16:creationId xmlns:a16="http://schemas.microsoft.com/office/drawing/2014/main" id="{A6941598-3B97-487E-8ADE-148D3195DDE1}"/>
+          <p:cNvPr id="6" name="图片 5">
+            <a:extLst>
+              <a:ext uri="{FF2B5EF4-FFF2-40B4-BE49-F238E27FC236}">
+                <a16:creationId xmlns:a16="http://schemas.microsoft.com/office/drawing/2014/main" id="{30FAD506-FADC-4BF8-AA18-BA73A44DFFAD}"/>
               </a:ext>
             </a:extLst>
           </p:cNvPr>
@@ -8615,8 +8761,38 @@
         </p:blipFill>
         <p:spPr>
           <a:xfrm>
-            <a:off x="7137335" y="3824886"/>
-            <a:ext cx="4571138" cy="775106"/>
+            <a:off x="838200" y="4113261"/>
+            <a:ext cx="4233169" cy="542714"/>
+          </a:xfrm>
+          <a:prstGeom prst="rect">
+            <a:avLst/>
+          </a:prstGeom>
+        </p:spPr>
+      </p:pic>
+      <p:pic>
+        <p:nvPicPr>
+          <p:cNvPr id="8" name="图片 7">
+            <a:extLst>
+              <a:ext uri="{FF2B5EF4-FFF2-40B4-BE49-F238E27FC236}">
+                <a16:creationId xmlns:a16="http://schemas.microsoft.com/office/drawing/2014/main" id="{79EA6BC2-D6C2-4711-A6AB-6BB4D09BBFE9}"/>
+              </a:ext>
+            </a:extLst>
+          </p:cNvPr>
+          <p:cNvPicPr>
+            <a:picLocks noChangeAspect="1"/>
+          </p:cNvPicPr>
+          <p:nvPr/>
+        </p:nvPicPr>
+        <p:blipFill>
+          <a:blip r:embed="rId4"/>
+          <a:stretch>
+            <a:fillRect/>
+          </a:stretch>
+        </p:blipFill>
+        <p:spPr>
+          <a:xfrm>
+            <a:off x="838199" y="4904005"/>
+            <a:ext cx="4233169" cy="875828"/>
           </a:xfrm>
           <a:prstGeom prst="rect">
             <a:avLst/>
@@ -8626,7 +8802,7 @@
     </p:spTree>
     <p:extLst>
       <p:ext uri="{BB962C8B-B14F-4D97-AF65-F5344CB8AC3E}">
-        <p14:creationId xmlns:p14="http://schemas.microsoft.com/office/powerpoint/2010/main" val="50088768"/>
+        <p14:creationId xmlns:p14="http://schemas.microsoft.com/office/powerpoint/2010/main" val="3575198876"/>
       </p:ext>
     </p:extLst>
   </p:cSld>

</xml_diff>